<commit_message>
Add Chinese version README
</commit_message>
<xml_diff>
--- a/illustration.pptx
+++ b/illustration.pptx
@@ -5,7 +5,7 @@
     <p:sldMasterId id="2147483684" r:id="rId1"/>
   </p:sldMasterIdLst>
   <p:notesMasterIdLst>
-    <p:notesMasterId r:id="rId9"/>
+    <p:notesMasterId r:id="rId10"/>
   </p:notesMasterIdLst>
   <p:sldIdLst>
     <p:sldId id="256" r:id="rId2"/>
@@ -15,6 +15,7 @@
     <p:sldId id="264" r:id="rId6"/>
     <p:sldId id="266" r:id="rId7"/>
     <p:sldId id="268" r:id="rId8"/>
+    <p:sldId id="269" r:id="rId9"/>
   </p:sldIdLst>
   <p:sldSz cx="12599988" cy="3600450"/>
   <p:notesSz cx="6858000" cy="9144000"/>
@@ -6946,6 +6947,2551 @@
     <p:extLst>
       <p:ext uri="{BB962C8B-B14F-4D97-AF65-F5344CB8AC3E}">
         <p14:creationId xmlns:p14="http://schemas.microsoft.com/office/powerpoint/2010/main" val="782348349"/>
+      </p:ext>
+    </p:extLst>
+  </p:cSld>
+  <p:clrMapOvr>
+    <a:masterClrMapping/>
+  </p:clrMapOvr>
+</p:sld>
+</file>
+
+<file path=ppt/slides/slide8.xml><?xml version="1.0" encoding="utf-8"?>
+<p:sld xmlns:a="http://schemas.openxmlformats.org/drawingml/2006/main" xmlns:r="http://schemas.openxmlformats.org/officeDocument/2006/relationships" xmlns:p="http://schemas.openxmlformats.org/presentationml/2006/main">
+  <p:cSld>
+    <p:spTree>
+      <p:nvGrpSpPr>
+        <p:cNvPr id="1" name=""/>
+        <p:cNvGrpSpPr/>
+        <p:nvPr/>
+      </p:nvGrpSpPr>
+      <p:grpSpPr>
+        <a:xfrm>
+          <a:off x="0" y="0"/>
+          <a:ext cx="0" cy="0"/>
+          <a:chOff x="0" y="0"/>
+          <a:chExt cx="0" cy="0"/>
+        </a:xfrm>
+      </p:grpSpPr>
+      <p:sp>
+        <p:nvSpPr>
+          <p:cNvPr id="51" name="文本框 50">
+            <a:extLst>
+              <a:ext uri="{FF2B5EF4-FFF2-40B4-BE49-F238E27FC236}">
+                <a16:creationId xmlns:a16="http://schemas.microsoft.com/office/drawing/2014/main" id="{83A2479E-A9E8-E272-AB51-25B708F2DB1A}"/>
+              </a:ext>
+            </a:extLst>
+          </p:cNvPr>
+          <p:cNvSpPr txBox="1"/>
+          <p:nvPr/>
+        </p:nvSpPr>
+        <p:spPr>
+          <a:xfrm>
+            <a:off x="579701" y="690589"/>
+            <a:ext cx="2781531" cy="369332"/>
+          </a:xfrm>
+          <a:prstGeom prst="rect">
+            <a:avLst/>
+          </a:prstGeom>
+          <a:noFill/>
+        </p:spPr>
+        <p:txBody>
+          <a:bodyPr wrap="none" rtlCol="0">
+            <a:spAutoFit/>
+          </a:bodyPr>
+          <a:lstStyle/>
+          <a:p>
+            <a:pPr algn="ctr"/>
+            <a:r>
+              <a:rPr lang="en-US" altLang="zh-CN" sz="1800" dirty="0" err="1">
+                <a:latin typeface="Source Sans 3" panose="020B0503030403020204" pitchFamily="34" charset="0"/>
+              </a:rPr>
+              <a:t>ValidCount</a:t>
+            </a:r>
+            <a:r>
+              <a:rPr lang="en-US" altLang="zh-CN" sz="1800" dirty="0">
+                <a:latin typeface="Source Sans 3" panose="020B0503030403020204" pitchFamily="34" charset="0"/>
+              </a:rPr>
+              <a:t> = 3	Penalty = 1</a:t>
+            </a:r>
+            <a:endParaRPr lang="en-GB" altLang="zh-CN" sz="2000" dirty="0">
+              <a:latin typeface="Source Sans 3" panose="020B0503030403020204" pitchFamily="34" charset="0"/>
+            </a:endParaRPr>
+          </a:p>
+        </p:txBody>
+      </p:sp>
+      <p:grpSp>
+        <p:nvGrpSpPr>
+          <p:cNvPr id="151" name="组合 150">
+            <a:extLst>
+              <a:ext uri="{FF2B5EF4-FFF2-40B4-BE49-F238E27FC236}">
+                <a16:creationId xmlns:a16="http://schemas.microsoft.com/office/drawing/2014/main" id="{C0C819AD-3DAC-732E-DEE9-1E5600005272}"/>
+              </a:ext>
+            </a:extLst>
+          </p:cNvPr>
+          <p:cNvGrpSpPr/>
+          <p:nvPr/>
+        </p:nvGrpSpPr>
+        <p:grpSpPr>
+          <a:xfrm>
+            <a:off x="387161" y="1816744"/>
+            <a:ext cx="3166610" cy="822064"/>
+            <a:chOff x="124332" y="1622991"/>
+            <a:chExt cx="3990975" cy="1036072"/>
+          </a:xfrm>
+        </p:grpSpPr>
+        <p:grpSp>
+          <p:nvGrpSpPr>
+            <p:cNvPr id="77" name="组合 76">
+              <a:extLst>
+                <a:ext uri="{FF2B5EF4-FFF2-40B4-BE49-F238E27FC236}">
+                  <a16:creationId xmlns:a16="http://schemas.microsoft.com/office/drawing/2014/main" id="{888E01D5-CF95-8374-8362-54F9EC5005CC}"/>
+                </a:ext>
+              </a:extLst>
+            </p:cNvPr>
+            <p:cNvGrpSpPr/>
+            <p:nvPr/>
+          </p:nvGrpSpPr>
+          <p:grpSpPr>
+            <a:xfrm>
+              <a:off x="124332" y="1622991"/>
+              <a:ext cx="3990975" cy="1036072"/>
+              <a:chOff x="124332" y="2184966"/>
+              <a:chExt cx="3990975" cy="1036072"/>
+            </a:xfrm>
+          </p:grpSpPr>
+          <p:cxnSp>
+            <p:nvCxnSpPr>
+              <p:cNvPr id="2" name="直接连接符 1">
+                <a:extLst>
+                  <a:ext uri="{FF2B5EF4-FFF2-40B4-BE49-F238E27FC236}">
+                    <a16:creationId xmlns:a16="http://schemas.microsoft.com/office/drawing/2014/main" id="{9C971075-E66A-EBDA-8468-3E205A89D652}"/>
+                  </a:ext>
+                </a:extLst>
+              </p:cNvPr>
+              <p:cNvCxnSpPr>
+                <a:cxnSpLocks/>
+              </p:cNvCxnSpPr>
+              <p:nvPr/>
+            </p:nvCxnSpPr>
+            <p:spPr>
+              <a:xfrm>
+                <a:off x="124332" y="2884957"/>
+                <a:ext cx="3990975" cy="0"/>
+              </a:xfrm>
+              <a:prstGeom prst="line">
+                <a:avLst/>
+              </a:prstGeom>
+              <a:noFill/>
+              <a:ln w="38100"/>
+            </p:spPr>
+            <p:style>
+              <a:lnRef idx="2">
+                <a:schemeClr val="accent1">
+                  <a:shade val="15000"/>
+                </a:schemeClr>
+              </a:lnRef>
+              <a:fillRef idx="1">
+                <a:schemeClr val="accent1"/>
+              </a:fillRef>
+              <a:effectRef idx="0">
+                <a:schemeClr val="accent1"/>
+              </a:effectRef>
+              <a:fontRef idx="minor">
+                <a:schemeClr val="lt1"/>
+              </a:fontRef>
+            </p:style>
+          </p:cxnSp>
+          <p:sp>
+            <p:nvSpPr>
+              <p:cNvPr id="10" name="椭圆 9">
+                <a:extLst>
+                  <a:ext uri="{FF2B5EF4-FFF2-40B4-BE49-F238E27FC236}">
+                    <a16:creationId xmlns:a16="http://schemas.microsoft.com/office/drawing/2014/main" id="{917E2F81-6BE5-B47A-0168-49385D213E7E}"/>
+                  </a:ext>
+                </a:extLst>
+              </p:cNvPr>
+              <p:cNvSpPr/>
+              <p:nvPr/>
+            </p:nvSpPr>
+            <p:spPr>
+              <a:xfrm>
+                <a:off x="495096" y="2585244"/>
+                <a:ext cx="205051" cy="205051"/>
+              </a:xfrm>
+              <a:prstGeom prst="ellipse">
+                <a:avLst/>
+              </a:prstGeom>
+              <a:solidFill>
+                <a:srgbClr val="C00000"/>
+              </a:solidFill>
+              <a:ln>
+                <a:noFill/>
+              </a:ln>
+            </p:spPr>
+            <p:style>
+              <a:lnRef idx="2">
+                <a:schemeClr val="accent1">
+                  <a:shade val="15000"/>
+                </a:schemeClr>
+              </a:lnRef>
+              <a:fillRef idx="1">
+                <a:schemeClr val="accent1"/>
+              </a:fillRef>
+              <a:effectRef idx="0">
+                <a:schemeClr val="accent1"/>
+              </a:effectRef>
+              <a:fontRef idx="minor">
+                <a:schemeClr val="lt1"/>
+              </a:fontRef>
+            </p:style>
+            <p:txBody>
+              <a:bodyPr rtlCol="0" anchor="ctr"/>
+              <a:lstStyle/>
+              <a:p>
+                <a:pPr algn="ctr"/>
+                <a:endParaRPr lang="en-GB"/>
+              </a:p>
+            </p:txBody>
+          </p:sp>
+          <p:sp>
+            <p:nvSpPr>
+              <p:cNvPr id="11" name="椭圆 10">
+                <a:extLst>
+                  <a:ext uri="{FF2B5EF4-FFF2-40B4-BE49-F238E27FC236}">
+                    <a16:creationId xmlns:a16="http://schemas.microsoft.com/office/drawing/2014/main" id="{4DF3A165-F09C-3603-BBEB-CCFE339E4668}"/>
+                  </a:ext>
+                </a:extLst>
+              </p:cNvPr>
+              <p:cNvSpPr/>
+              <p:nvPr/>
+            </p:nvSpPr>
+            <p:spPr>
+              <a:xfrm>
+                <a:off x="884177" y="3015987"/>
+                <a:ext cx="205051" cy="205051"/>
+              </a:xfrm>
+              <a:prstGeom prst="ellipse">
+                <a:avLst/>
+              </a:prstGeom>
+              <a:solidFill>
+                <a:schemeClr val="bg1">
+                  <a:lumMod val="75000"/>
+                </a:schemeClr>
+              </a:solidFill>
+              <a:ln>
+                <a:noFill/>
+              </a:ln>
+            </p:spPr>
+            <p:style>
+              <a:lnRef idx="2">
+                <a:schemeClr val="accent1">
+                  <a:shade val="15000"/>
+                </a:schemeClr>
+              </a:lnRef>
+              <a:fillRef idx="1">
+                <a:schemeClr val="accent1"/>
+              </a:fillRef>
+              <a:effectRef idx="0">
+                <a:schemeClr val="accent1"/>
+              </a:effectRef>
+              <a:fontRef idx="minor">
+                <a:schemeClr val="lt1"/>
+              </a:fontRef>
+            </p:style>
+            <p:txBody>
+              <a:bodyPr rtlCol="0" anchor="ctr"/>
+              <a:lstStyle/>
+              <a:p>
+                <a:pPr algn="ctr"/>
+                <a:endParaRPr lang="en-GB" dirty="0">
+                  <a:solidFill>
+                    <a:schemeClr val="bg1">
+                      <a:lumMod val="95000"/>
+                    </a:schemeClr>
+                  </a:solidFill>
+                </a:endParaRPr>
+              </a:p>
+            </p:txBody>
+          </p:sp>
+          <p:sp>
+            <p:nvSpPr>
+              <p:cNvPr id="12" name="椭圆 11">
+                <a:extLst>
+                  <a:ext uri="{FF2B5EF4-FFF2-40B4-BE49-F238E27FC236}">
+                    <a16:creationId xmlns:a16="http://schemas.microsoft.com/office/drawing/2014/main" id="{E0414D03-9D86-1249-1CFA-C76E2F812091}"/>
+                  </a:ext>
+                </a:extLst>
+              </p:cNvPr>
+              <p:cNvSpPr/>
+              <p:nvPr/>
+            </p:nvSpPr>
+            <p:spPr>
+              <a:xfrm>
+                <a:off x="1450581" y="2560490"/>
+                <a:ext cx="205051" cy="205051"/>
+              </a:xfrm>
+              <a:prstGeom prst="ellipse">
+                <a:avLst/>
+              </a:prstGeom>
+              <a:solidFill>
+                <a:srgbClr val="C00000"/>
+              </a:solidFill>
+              <a:ln>
+                <a:noFill/>
+              </a:ln>
+            </p:spPr>
+            <p:style>
+              <a:lnRef idx="2">
+                <a:schemeClr val="accent1">
+                  <a:shade val="15000"/>
+                </a:schemeClr>
+              </a:lnRef>
+              <a:fillRef idx="1">
+                <a:schemeClr val="accent1"/>
+              </a:fillRef>
+              <a:effectRef idx="0">
+                <a:schemeClr val="accent1"/>
+              </a:effectRef>
+              <a:fontRef idx="minor">
+                <a:schemeClr val="lt1"/>
+              </a:fontRef>
+            </p:style>
+            <p:txBody>
+              <a:bodyPr rtlCol="0" anchor="ctr"/>
+              <a:lstStyle/>
+              <a:p>
+                <a:pPr algn="ctr"/>
+                <a:endParaRPr lang="en-GB"/>
+              </a:p>
+            </p:txBody>
+          </p:sp>
+          <p:sp>
+            <p:nvSpPr>
+              <p:cNvPr id="13" name="椭圆 12">
+                <a:extLst>
+                  <a:ext uri="{FF2B5EF4-FFF2-40B4-BE49-F238E27FC236}">
+                    <a16:creationId xmlns:a16="http://schemas.microsoft.com/office/drawing/2014/main" id="{BEE99AC3-93A4-B54F-F6B2-BFC4F54CC166}"/>
+                  </a:ext>
+                </a:extLst>
+              </p:cNvPr>
+              <p:cNvSpPr/>
+              <p:nvPr/>
+            </p:nvSpPr>
+            <p:spPr>
+              <a:xfrm>
+                <a:off x="1821602" y="2548877"/>
+                <a:ext cx="205051" cy="205051"/>
+              </a:xfrm>
+              <a:prstGeom prst="ellipse">
+                <a:avLst/>
+              </a:prstGeom>
+              <a:solidFill>
+                <a:srgbClr val="C00000"/>
+              </a:solidFill>
+              <a:ln>
+                <a:noFill/>
+              </a:ln>
+            </p:spPr>
+            <p:style>
+              <a:lnRef idx="2">
+                <a:schemeClr val="accent1">
+                  <a:shade val="15000"/>
+                </a:schemeClr>
+              </a:lnRef>
+              <a:fillRef idx="1">
+                <a:schemeClr val="accent1"/>
+              </a:fillRef>
+              <a:effectRef idx="0">
+                <a:schemeClr val="accent1"/>
+              </a:effectRef>
+              <a:fontRef idx="minor">
+                <a:schemeClr val="lt1"/>
+              </a:fontRef>
+            </p:style>
+            <p:txBody>
+              <a:bodyPr rtlCol="0" anchor="ctr"/>
+              <a:lstStyle/>
+              <a:p>
+                <a:pPr algn="ctr"/>
+                <a:endParaRPr lang="en-GB"/>
+              </a:p>
+            </p:txBody>
+          </p:sp>
+          <p:sp>
+            <p:nvSpPr>
+              <p:cNvPr id="14" name="椭圆 13">
+                <a:extLst>
+                  <a:ext uri="{FF2B5EF4-FFF2-40B4-BE49-F238E27FC236}">
+                    <a16:creationId xmlns:a16="http://schemas.microsoft.com/office/drawing/2014/main" id="{0A85AB52-7644-F3AE-7D09-C5F20AD2A061}"/>
+                  </a:ext>
+                </a:extLst>
+              </p:cNvPr>
+              <p:cNvSpPr/>
+              <p:nvPr/>
+            </p:nvSpPr>
+            <p:spPr>
+              <a:xfrm>
+                <a:off x="2119819" y="3000774"/>
+                <a:ext cx="205051" cy="205051"/>
+              </a:xfrm>
+              <a:prstGeom prst="ellipse">
+                <a:avLst/>
+              </a:prstGeom>
+              <a:solidFill>
+                <a:schemeClr val="bg1">
+                  <a:lumMod val="75000"/>
+                </a:schemeClr>
+              </a:solidFill>
+              <a:ln>
+                <a:noFill/>
+              </a:ln>
+            </p:spPr>
+            <p:style>
+              <a:lnRef idx="2">
+                <a:schemeClr val="accent1">
+                  <a:shade val="15000"/>
+                </a:schemeClr>
+              </a:lnRef>
+              <a:fillRef idx="1">
+                <a:schemeClr val="accent1"/>
+              </a:fillRef>
+              <a:effectRef idx="0">
+                <a:schemeClr val="accent1"/>
+              </a:effectRef>
+              <a:fontRef idx="minor">
+                <a:schemeClr val="lt1"/>
+              </a:fontRef>
+            </p:style>
+            <p:txBody>
+              <a:bodyPr rtlCol="0" anchor="ctr"/>
+              <a:lstStyle/>
+              <a:p>
+                <a:pPr algn="ctr"/>
+                <a:endParaRPr lang="en-GB">
+                  <a:solidFill>
+                    <a:schemeClr val="bg1">
+                      <a:lumMod val="95000"/>
+                    </a:schemeClr>
+                  </a:solidFill>
+                </a:endParaRPr>
+              </a:p>
+            </p:txBody>
+          </p:sp>
+          <p:sp>
+            <p:nvSpPr>
+              <p:cNvPr id="15" name="椭圆 14">
+                <a:extLst>
+                  <a:ext uri="{FF2B5EF4-FFF2-40B4-BE49-F238E27FC236}">
+                    <a16:creationId xmlns:a16="http://schemas.microsoft.com/office/drawing/2014/main" id="{39BE7274-E5EA-9466-15B7-B06273B63006}"/>
+                  </a:ext>
+                </a:extLst>
+              </p:cNvPr>
+              <p:cNvSpPr/>
+              <p:nvPr/>
+            </p:nvSpPr>
+            <p:spPr>
+              <a:xfrm>
+                <a:off x="2449441" y="2979620"/>
+                <a:ext cx="205051" cy="205051"/>
+              </a:xfrm>
+              <a:prstGeom prst="ellipse">
+                <a:avLst/>
+              </a:prstGeom>
+              <a:solidFill>
+                <a:schemeClr val="bg1">
+                  <a:lumMod val="75000"/>
+                </a:schemeClr>
+              </a:solidFill>
+              <a:ln>
+                <a:noFill/>
+              </a:ln>
+            </p:spPr>
+            <p:style>
+              <a:lnRef idx="2">
+                <a:schemeClr val="accent1">
+                  <a:shade val="15000"/>
+                </a:schemeClr>
+              </a:lnRef>
+              <a:fillRef idx="1">
+                <a:schemeClr val="accent1"/>
+              </a:fillRef>
+              <a:effectRef idx="0">
+                <a:schemeClr val="accent1"/>
+              </a:effectRef>
+              <a:fontRef idx="minor">
+                <a:schemeClr val="lt1"/>
+              </a:fontRef>
+            </p:style>
+            <p:txBody>
+              <a:bodyPr rtlCol="0" anchor="ctr"/>
+              <a:lstStyle/>
+              <a:p>
+                <a:pPr algn="ctr"/>
+                <a:endParaRPr lang="en-GB">
+                  <a:solidFill>
+                    <a:schemeClr val="bg1">
+                      <a:lumMod val="95000"/>
+                    </a:schemeClr>
+                  </a:solidFill>
+                </a:endParaRPr>
+              </a:p>
+            </p:txBody>
+          </p:sp>
+          <p:sp>
+            <p:nvSpPr>
+              <p:cNvPr id="16" name="椭圆 15">
+                <a:extLst>
+                  <a:ext uri="{FF2B5EF4-FFF2-40B4-BE49-F238E27FC236}">
+                    <a16:creationId xmlns:a16="http://schemas.microsoft.com/office/drawing/2014/main" id="{D2724984-4543-550A-8B24-148C150C9C77}"/>
+                  </a:ext>
+                </a:extLst>
+              </p:cNvPr>
+              <p:cNvSpPr/>
+              <p:nvPr/>
+            </p:nvSpPr>
+            <p:spPr>
+              <a:xfrm>
+                <a:off x="2885341" y="2353720"/>
+                <a:ext cx="205051" cy="205051"/>
+              </a:xfrm>
+              <a:prstGeom prst="ellipse">
+                <a:avLst/>
+              </a:prstGeom>
+              <a:solidFill>
+                <a:srgbClr val="C00000"/>
+              </a:solidFill>
+              <a:ln>
+                <a:noFill/>
+              </a:ln>
+            </p:spPr>
+            <p:style>
+              <a:lnRef idx="2">
+                <a:schemeClr val="accent1">
+                  <a:shade val="15000"/>
+                </a:schemeClr>
+              </a:lnRef>
+              <a:fillRef idx="1">
+                <a:schemeClr val="accent1"/>
+              </a:fillRef>
+              <a:effectRef idx="0">
+                <a:schemeClr val="accent1"/>
+              </a:effectRef>
+              <a:fontRef idx="minor">
+                <a:schemeClr val="lt1"/>
+              </a:fontRef>
+            </p:style>
+            <p:txBody>
+              <a:bodyPr rtlCol="0" anchor="ctr"/>
+              <a:lstStyle/>
+              <a:p>
+                <a:pPr algn="ctr"/>
+                <a:endParaRPr lang="en-GB"/>
+              </a:p>
+            </p:txBody>
+          </p:sp>
+          <p:sp>
+            <p:nvSpPr>
+              <p:cNvPr id="17" name="椭圆 16">
+                <a:extLst>
+                  <a:ext uri="{FF2B5EF4-FFF2-40B4-BE49-F238E27FC236}">
+                    <a16:creationId xmlns:a16="http://schemas.microsoft.com/office/drawing/2014/main" id="{3D4D95C5-A704-3195-8B77-AC942C59F8A3}"/>
+                  </a:ext>
+                </a:extLst>
+              </p:cNvPr>
+              <p:cNvSpPr/>
+              <p:nvPr/>
+            </p:nvSpPr>
+            <p:spPr>
+              <a:xfrm>
+                <a:off x="3243800" y="2184966"/>
+                <a:ext cx="205051" cy="205051"/>
+              </a:xfrm>
+              <a:prstGeom prst="ellipse">
+                <a:avLst/>
+              </a:prstGeom>
+              <a:solidFill>
+                <a:srgbClr val="C00000"/>
+              </a:solidFill>
+              <a:ln>
+                <a:noFill/>
+              </a:ln>
+            </p:spPr>
+            <p:style>
+              <a:lnRef idx="2">
+                <a:schemeClr val="accent1">
+                  <a:shade val="15000"/>
+                </a:schemeClr>
+              </a:lnRef>
+              <a:fillRef idx="1">
+                <a:schemeClr val="accent1"/>
+              </a:fillRef>
+              <a:effectRef idx="0">
+                <a:schemeClr val="accent1"/>
+              </a:effectRef>
+              <a:fontRef idx="minor">
+                <a:schemeClr val="lt1"/>
+              </a:fontRef>
+            </p:style>
+            <p:txBody>
+              <a:bodyPr rtlCol="0" anchor="ctr"/>
+              <a:lstStyle/>
+              <a:p>
+                <a:pPr algn="ctr"/>
+                <a:endParaRPr lang="en-GB"/>
+              </a:p>
+            </p:txBody>
+          </p:sp>
+          <p:sp>
+            <p:nvSpPr>
+              <p:cNvPr id="18" name="椭圆 17">
+                <a:extLst>
+                  <a:ext uri="{FF2B5EF4-FFF2-40B4-BE49-F238E27FC236}">
+                    <a16:creationId xmlns:a16="http://schemas.microsoft.com/office/drawing/2014/main" id="{1C33E2E8-AF17-CE85-0D15-E0707E481823}"/>
+                  </a:ext>
+                </a:extLst>
+              </p:cNvPr>
+              <p:cNvSpPr/>
+              <p:nvPr/>
+            </p:nvSpPr>
+            <p:spPr>
+              <a:xfrm>
+                <a:off x="3579718" y="2240247"/>
+                <a:ext cx="205051" cy="205051"/>
+              </a:xfrm>
+              <a:prstGeom prst="ellipse">
+                <a:avLst/>
+              </a:prstGeom>
+              <a:solidFill>
+                <a:srgbClr val="C00000"/>
+              </a:solidFill>
+              <a:ln>
+                <a:noFill/>
+              </a:ln>
+            </p:spPr>
+            <p:style>
+              <a:lnRef idx="2">
+                <a:schemeClr val="accent1">
+                  <a:shade val="15000"/>
+                </a:schemeClr>
+              </a:lnRef>
+              <a:fillRef idx="1">
+                <a:schemeClr val="accent1"/>
+              </a:fillRef>
+              <a:effectRef idx="0">
+                <a:schemeClr val="accent1"/>
+              </a:effectRef>
+              <a:fontRef idx="minor">
+                <a:schemeClr val="lt1"/>
+              </a:fontRef>
+            </p:style>
+            <p:txBody>
+              <a:bodyPr rtlCol="0" anchor="ctr"/>
+              <a:lstStyle/>
+              <a:p>
+                <a:pPr algn="ctr"/>
+                <a:endParaRPr lang="en-GB" dirty="0"/>
+              </a:p>
+            </p:txBody>
+          </p:sp>
+          <p:sp>
+            <p:nvSpPr>
+              <p:cNvPr id="150" name="椭圆 149">
+                <a:extLst>
+                  <a:ext uri="{FF2B5EF4-FFF2-40B4-BE49-F238E27FC236}">
+                    <a16:creationId xmlns:a16="http://schemas.microsoft.com/office/drawing/2014/main" id="{71AD4897-A539-D823-08F0-DF08A32FEFF3}"/>
+                  </a:ext>
+                </a:extLst>
+              </p:cNvPr>
+              <p:cNvSpPr/>
+              <p:nvPr/>
+            </p:nvSpPr>
+            <p:spPr>
+              <a:xfrm>
+                <a:off x="1123763" y="2581259"/>
+                <a:ext cx="205051" cy="205051"/>
+              </a:xfrm>
+              <a:prstGeom prst="ellipse">
+                <a:avLst/>
+              </a:prstGeom>
+              <a:solidFill>
+                <a:srgbClr val="C00000"/>
+              </a:solidFill>
+              <a:ln>
+                <a:noFill/>
+              </a:ln>
+            </p:spPr>
+            <p:style>
+              <a:lnRef idx="2">
+                <a:schemeClr val="accent1">
+                  <a:shade val="15000"/>
+                </a:schemeClr>
+              </a:lnRef>
+              <a:fillRef idx="1">
+                <a:schemeClr val="accent1"/>
+              </a:fillRef>
+              <a:effectRef idx="0">
+                <a:schemeClr val="accent1"/>
+              </a:effectRef>
+              <a:fontRef idx="minor">
+                <a:schemeClr val="lt1"/>
+              </a:fontRef>
+            </p:style>
+            <p:txBody>
+              <a:bodyPr rtlCol="0" anchor="ctr"/>
+              <a:lstStyle/>
+              <a:p>
+                <a:pPr algn="ctr"/>
+                <a:endParaRPr lang="en-GB"/>
+              </a:p>
+            </p:txBody>
+          </p:sp>
+        </p:grpSp>
+        <p:sp>
+          <p:nvSpPr>
+            <p:cNvPr id="90" name="椭圆 89">
+              <a:extLst>
+                <a:ext uri="{FF2B5EF4-FFF2-40B4-BE49-F238E27FC236}">
+                  <a16:creationId xmlns:a16="http://schemas.microsoft.com/office/drawing/2014/main" id="{F0443017-B445-8151-85F0-BF7DD1AD9F46}"/>
+                </a:ext>
+              </a:extLst>
+            </p:cNvPr>
+            <p:cNvSpPr/>
+            <p:nvPr/>
+          </p:nvSpPr>
+          <p:spPr>
+            <a:xfrm>
+              <a:off x="148682" y="1998515"/>
+              <a:ext cx="205051" cy="205051"/>
+            </a:xfrm>
+            <a:prstGeom prst="ellipse">
+              <a:avLst/>
+            </a:prstGeom>
+            <a:solidFill>
+              <a:srgbClr val="28D25C"/>
+            </a:solidFill>
+            <a:ln>
+              <a:noFill/>
+            </a:ln>
+          </p:spPr>
+          <p:style>
+            <a:lnRef idx="2">
+              <a:schemeClr val="accent1">
+                <a:shade val="15000"/>
+              </a:schemeClr>
+            </a:lnRef>
+            <a:fillRef idx="1">
+              <a:schemeClr val="accent1"/>
+            </a:fillRef>
+            <a:effectRef idx="0">
+              <a:schemeClr val="accent1"/>
+            </a:effectRef>
+            <a:fontRef idx="minor">
+              <a:schemeClr val="lt1"/>
+            </a:fontRef>
+          </p:style>
+          <p:txBody>
+            <a:bodyPr rtlCol="0" anchor="ctr"/>
+            <a:lstStyle/>
+            <a:p>
+              <a:pPr algn="ctr"/>
+              <a:endParaRPr lang="en-GB"/>
+            </a:p>
+          </p:txBody>
+        </p:sp>
+      </p:grpSp>
+      <p:sp>
+        <p:nvSpPr>
+          <p:cNvPr id="95" name="文本框 94">
+            <a:extLst>
+              <a:ext uri="{FF2B5EF4-FFF2-40B4-BE49-F238E27FC236}">
+                <a16:creationId xmlns:a16="http://schemas.microsoft.com/office/drawing/2014/main" id="{DF844A05-8194-D315-491E-4963583CF6D3}"/>
+              </a:ext>
+            </a:extLst>
+          </p:cNvPr>
+          <p:cNvSpPr txBox="1"/>
+          <p:nvPr/>
+        </p:nvSpPr>
+        <p:spPr>
+          <a:xfrm>
+            <a:off x="4759875" y="690589"/>
+            <a:ext cx="2781531" cy="369332"/>
+          </a:xfrm>
+          <a:prstGeom prst="rect">
+            <a:avLst/>
+          </a:prstGeom>
+          <a:noFill/>
+        </p:spPr>
+        <p:txBody>
+          <a:bodyPr wrap="none" rtlCol="0">
+            <a:spAutoFit/>
+          </a:bodyPr>
+          <a:lstStyle/>
+          <a:p>
+            <a:pPr algn="ctr"/>
+            <a:r>
+              <a:rPr lang="en-US" altLang="zh-CN" sz="1800" dirty="0" err="1">
+                <a:latin typeface="Source Sans 3" panose="020B0503030403020204" pitchFamily="34" charset="0"/>
+              </a:rPr>
+              <a:t>ValidCount</a:t>
+            </a:r>
+            <a:r>
+              <a:rPr lang="en-US" altLang="zh-CN" sz="1800" dirty="0">
+                <a:latin typeface="Source Sans 3" panose="020B0503030403020204" pitchFamily="34" charset="0"/>
+              </a:rPr>
+              <a:t> = 3	Penalty = 2</a:t>
+            </a:r>
+            <a:endParaRPr lang="en-GB" altLang="zh-CN" sz="2000" dirty="0">
+              <a:latin typeface="Source Sans 3" panose="020B0503030403020204" pitchFamily="34" charset="0"/>
+            </a:endParaRPr>
+          </a:p>
+        </p:txBody>
+      </p:sp>
+      <p:sp>
+        <p:nvSpPr>
+          <p:cNvPr id="123" name="文本框 122">
+            <a:extLst>
+              <a:ext uri="{FF2B5EF4-FFF2-40B4-BE49-F238E27FC236}">
+                <a16:creationId xmlns:a16="http://schemas.microsoft.com/office/drawing/2014/main" id="{71BD8818-F509-E6B9-5337-0C5AAE19F435}"/>
+              </a:ext>
+            </a:extLst>
+          </p:cNvPr>
+          <p:cNvSpPr txBox="1"/>
+          <p:nvPr/>
+        </p:nvSpPr>
+        <p:spPr>
+          <a:xfrm>
+            <a:off x="8905153" y="690589"/>
+            <a:ext cx="2781531" cy="369332"/>
+          </a:xfrm>
+          <a:prstGeom prst="rect">
+            <a:avLst/>
+          </a:prstGeom>
+          <a:noFill/>
+        </p:spPr>
+        <p:txBody>
+          <a:bodyPr wrap="none" rtlCol="0">
+            <a:spAutoFit/>
+          </a:bodyPr>
+          <a:lstStyle/>
+          <a:p>
+            <a:pPr algn="ctr"/>
+            <a:r>
+              <a:rPr lang="en-US" altLang="zh-CN" sz="1800" dirty="0" err="1">
+                <a:latin typeface="Source Sans 3" panose="020B0503030403020204" pitchFamily="34" charset="0"/>
+              </a:rPr>
+              <a:t>ValidCount</a:t>
+            </a:r>
+            <a:r>
+              <a:rPr lang="en-US" altLang="zh-CN" sz="1800" dirty="0">
+                <a:latin typeface="Source Sans 3" panose="020B0503030403020204" pitchFamily="34" charset="0"/>
+              </a:rPr>
+              <a:t> = 7	Penalty = 2</a:t>
+            </a:r>
+            <a:endParaRPr lang="en-GB" altLang="zh-CN" sz="2000" dirty="0">
+              <a:latin typeface="Source Sans 3" panose="020B0503030403020204" pitchFamily="34" charset="0"/>
+            </a:endParaRPr>
+          </a:p>
+        </p:txBody>
+      </p:sp>
+      <p:grpSp>
+        <p:nvGrpSpPr>
+          <p:cNvPr id="152" name="组合 151">
+            <a:extLst>
+              <a:ext uri="{FF2B5EF4-FFF2-40B4-BE49-F238E27FC236}">
+                <a16:creationId xmlns:a16="http://schemas.microsoft.com/office/drawing/2014/main" id="{D9EE1F5E-CA4D-F1EC-A355-B8ED5104BD64}"/>
+              </a:ext>
+            </a:extLst>
+          </p:cNvPr>
+          <p:cNvGrpSpPr/>
+          <p:nvPr/>
+        </p:nvGrpSpPr>
+        <p:grpSpPr>
+          <a:xfrm>
+            <a:off x="4552020" y="1819569"/>
+            <a:ext cx="3155727" cy="819239"/>
+            <a:chOff x="124332" y="1622991"/>
+            <a:chExt cx="3990975" cy="1036072"/>
+          </a:xfrm>
+        </p:grpSpPr>
+        <p:grpSp>
+          <p:nvGrpSpPr>
+            <p:cNvPr id="153" name="组合 152">
+              <a:extLst>
+                <a:ext uri="{FF2B5EF4-FFF2-40B4-BE49-F238E27FC236}">
+                  <a16:creationId xmlns:a16="http://schemas.microsoft.com/office/drawing/2014/main" id="{E03316AD-89DF-ED0C-A6F8-773CA8FAF43A}"/>
+                </a:ext>
+              </a:extLst>
+            </p:cNvPr>
+            <p:cNvGrpSpPr/>
+            <p:nvPr/>
+          </p:nvGrpSpPr>
+          <p:grpSpPr>
+            <a:xfrm>
+              <a:off x="124332" y="1622991"/>
+              <a:ext cx="3990975" cy="1036072"/>
+              <a:chOff x="124332" y="2184966"/>
+              <a:chExt cx="3990975" cy="1036072"/>
+            </a:xfrm>
+          </p:grpSpPr>
+          <p:cxnSp>
+            <p:nvCxnSpPr>
+              <p:cNvPr id="155" name="直接连接符 154">
+                <a:extLst>
+                  <a:ext uri="{FF2B5EF4-FFF2-40B4-BE49-F238E27FC236}">
+                    <a16:creationId xmlns:a16="http://schemas.microsoft.com/office/drawing/2014/main" id="{94CB10EF-38FA-BA1A-E285-E65AC261D63E}"/>
+                  </a:ext>
+                </a:extLst>
+              </p:cNvPr>
+              <p:cNvCxnSpPr>
+                <a:cxnSpLocks/>
+              </p:cNvCxnSpPr>
+              <p:nvPr/>
+            </p:nvCxnSpPr>
+            <p:spPr>
+              <a:xfrm>
+                <a:off x="124332" y="2884957"/>
+                <a:ext cx="3990975" cy="0"/>
+              </a:xfrm>
+              <a:prstGeom prst="line">
+                <a:avLst/>
+              </a:prstGeom>
+              <a:noFill/>
+              <a:ln w="38100"/>
+            </p:spPr>
+            <p:style>
+              <a:lnRef idx="2">
+                <a:schemeClr val="accent1">
+                  <a:shade val="15000"/>
+                </a:schemeClr>
+              </a:lnRef>
+              <a:fillRef idx="1">
+                <a:schemeClr val="accent1"/>
+              </a:fillRef>
+              <a:effectRef idx="0">
+                <a:schemeClr val="accent1"/>
+              </a:effectRef>
+              <a:fontRef idx="minor">
+                <a:schemeClr val="lt1"/>
+              </a:fontRef>
+            </p:style>
+          </p:cxnSp>
+          <p:sp>
+            <p:nvSpPr>
+              <p:cNvPr id="156" name="椭圆 155">
+                <a:extLst>
+                  <a:ext uri="{FF2B5EF4-FFF2-40B4-BE49-F238E27FC236}">
+                    <a16:creationId xmlns:a16="http://schemas.microsoft.com/office/drawing/2014/main" id="{2AF5B2DC-C10F-631B-9BE7-44CC88CB90C2}"/>
+                  </a:ext>
+                </a:extLst>
+              </p:cNvPr>
+              <p:cNvSpPr/>
+              <p:nvPr/>
+            </p:nvSpPr>
+            <p:spPr>
+              <a:xfrm>
+                <a:off x="495096" y="2585244"/>
+                <a:ext cx="205051" cy="205051"/>
+              </a:xfrm>
+              <a:prstGeom prst="ellipse">
+                <a:avLst/>
+              </a:prstGeom>
+              <a:solidFill>
+                <a:srgbClr val="C00000"/>
+              </a:solidFill>
+              <a:ln>
+                <a:noFill/>
+              </a:ln>
+            </p:spPr>
+            <p:style>
+              <a:lnRef idx="2">
+                <a:schemeClr val="accent1">
+                  <a:shade val="15000"/>
+                </a:schemeClr>
+              </a:lnRef>
+              <a:fillRef idx="1">
+                <a:schemeClr val="accent1"/>
+              </a:fillRef>
+              <a:effectRef idx="0">
+                <a:schemeClr val="accent1"/>
+              </a:effectRef>
+              <a:fontRef idx="minor">
+                <a:schemeClr val="lt1"/>
+              </a:fontRef>
+            </p:style>
+            <p:txBody>
+              <a:bodyPr rtlCol="0" anchor="ctr"/>
+              <a:lstStyle/>
+              <a:p>
+                <a:pPr algn="ctr"/>
+                <a:endParaRPr lang="en-GB"/>
+              </a:p>
+            </p:txBody>
+          </p:sp>
+          <p:sp>
+            <p:nvSpPr>
+              <p:cNvPr id="157" name="椭圆 156">
+                <a:extLst>
+                  <a:ext uri="{FF2B5EF4-FFF2-40B4-BE49-F238E27FC236}">
+                    <a16:creationId xmlns:a16="http://schemas.microsoft.com/office/drawing/2014/main" id="{76C88557-5B17-5034-E73C-20D9D20C2875}"/>
+                  </a:ext>
+                </a:extLst>
+              </p:cNvPr>
+              <p:cNvSpPr/>
+              <p:nvPr/>
+            </p:nvSpPr>
+            <p:spPr>
+              <a:xfrm>
+                <a:off x="884177" y="3015987"/>
+                <a:ext cx="205051" cy="205051"/>
+              </a:xfrm>
+              <a:prstGeom prst="ellipse">
+                <a:avLst/>
+              </a:prstGeom>
+              <a:solidFill>
+                <a:schemeClr val="bg1">
+                  <a:lumMod val="75000"/>
+                </a:schemeClr>
+              </a:solidFill>
+              <a:ln>
+                <a:noFill/>
+              </a:ln>
+            </p:spPr>
+            <p:style>
+              <a:lnRef idx="2">
+                <a:schemeClr val="accent1">
+                  <a:shade val="15000"/>
+                </a:schemeClr>
+              </a:lnRef>
+              <a:fillRef idx="1">
+                <a:schemeClr val="accent1"/>
+              </a:fillRef>
+              <a:effectRef idx="0">
+                <a:schemeClr val="accent1"/>
+              </a:effectRef>
+              <a:fontRef idx="minor">
+                <a:schemeClr val="lt1"/>
+              </a:fontRef>
+            </p:style>
+            <p:txBody>
+              <a:bodyPr rtlCol="0" anchor="ctr"/>
+              <a:lstStyle/>
+              <a:p>
+                <a:pPr algn="ctr"/>
+                <a:endParaRPr lang="en-GB" dirty="0">
+                  <a:solidFill>
+                    <a:schemeClr val="bg1">
+                      <a:lumMod val="95000"/>
+                    </a:schemeClr>
+                  </a:solidFill>
+                </a:endParaRPr>
+              </a:p>
+            </p:txBody>
+          </p:sp>
+          <p:sp>
+            <p:nvSpPr>
+              <p:cNvPr id="158" name="椭圆 157">
+                <a:extLst>
+                  <a:ext uri="{FF2B5EF4-FFF2-40B4-BE49-F238E27FC236}">
+                    <a16:creationId xmlns:a16="http://schemas.microsoft.com/office/drawing/2014/main" id="{EA4950E0-9022-2ED1-FAA1-A2970D35BEE3}"/>
+                  </a:ext>
+                </a:extLst>
+              </p:cNvPr>
+              <p:cNvSpPr/>
+              <p:nvPr/>
+            </p:nvSpPr>
+            <p:spPr>
+              <a:xfrm>
+                <a:off x="1450581" y="2560490"/>
+                <a:ext cx="205051" cy="205051"/>
+              </a:xfrm>
+              <a:prstGeom prst="ellipse">
+                <a:avLst/>
+              </a:prstGeom>
+              <a:solidFill>
+                <a:srgbClr val="C00000"/>
+              </a:solidFill>
+              <a:ln>
+                <a:noFill/>
+              </a:ln>
+            </p:spPr>
+            <p:style>
+              <a:lnRef idx="2">
+                <a:schemeClr val="accent1">
+                  <a:shade val="15000"/>
+                </a:schemeClr>
+              </a:lnRef>
+              <a:fillRef idx="1">
+                <a:schemeClr val="accent1"/>
+              </a:fillRef>
+              <a:effectRef idx="0">
+                <a:schemeClr val="accent1"/>
+              </a:effectRef>
+              <a:fontRef idx="minor">
+                <a:schemeClr val="lt1"/>
+              </a:fontRef>
+            </p:style>
+            <p:txBody>
+              <a:bodyPr rtlCol="0" anchor="ctr"/>
+              <a:lstStyle/>
+              <a:p>
+                <a:pPr algn="ctr"/>
+                <a:endParaRPr lang="en-GB"/>
+              </a:p>
+            </p:txBody>
+          </p:sp>
+          <p:sp>
+            <p:nvSpPr>
+              <p:cNvPr id="159" name="椭圆 158">
+                <a:extLst>
+                  <a:ext uri="{FF2B5EF4-FFF2-40B4-BE49-F238E27FC236}">
+                    <a16:creationId xmlns:a16="http://schemas.microsoft.com/office/drawing/2014/main" id="{3367D19C-6EEC-1093-0841-98FA6E091CD2}"/>
+                  </a:ext>
+                </a:extLst>
+              </p:cNvPr>
+              <p:cNvSpPr/>
+              <p:nvPr/>
+            </p:nvSpPr>
+            <p:spPr>
+              <a:xfrm>
+                <a:off x="1821602" y="2548877"/>
+                <a:ext cx="205051" cy="205051"/>
+              </a:xfrm>
+              <a:prstGeom prst="ellipse">
+                <a:avLst/>
+              </a:prstGeom>
+              <a:solidFill>
+                <a:srgbClr val="C00000"/>
+              </a:solidFill>
+              <a:ln>
+                <a:noFill/>
+              </a:ln>
+            </p:spPr>
+            <p:style>
+              <a:lnRef idx="2">
+                <a:schemeClr val="accent1">
+                  <a:shade val="15000"/>
+                </a:schemeClr>
+              </a:lnRef>
+              <a:fillRef idx="1">
+                <a:schemeClr val="accent1"/>
+              </a:fillRef>
+              <a:effectRef idx="0">
+                <a:schemeClr val="accent1"/>
+              </a:effectRef>
+              <a:fontRef idx="minor">
+                <a:schemeClr val="lt1"/>
+              </a:fontRef>
+            </p:style>
+            <p:txBody>
+              <a:bodyPr rtlCol="0" anchor="ctr"/>
+              <a:lstStyle/>
+              <a:p>
+                <a:pPr algn="ctr"/>
+                <a:endParaRPr lang="en-GB"/>
+              </a:p>
+            </p:txBody>
+          </p:sp>
+          <p:sp>
+            <p:nvSpPr>
+              <p:cNvPr id="160" name="椭圆 159">
+                <a:extLst>
+                  <a:ext uri="{FF2B5EF4-FFF2-40B4-BE49-F238E27FC236}">
+                    <a16:creationId xmlns:a16="http://schemas.microsoft.com/office/drawing/2014/main" id="{07616384-1A99-FA24-9E69-F476DFDE3C89}"/>
+                  </a:ext>
+                </a:extLst>
+              </p:cNvPr>
+              <p:cNvSpPr/>
+              <p:nvPr/>
+            </p:nvSpPr>
+            <p:spPr>
+              <a:xfrm>
+                <a:off x="2119819" y="3000774"/>
+                <a:ext cx="205051" cy="205051"/>
+              </a:xfrm>
+              <a:prstGeom prst="ellipse">
+                <a:avLst/>
+              </a:prstGeom>
+              <a:solidFill>
+                <a:schemeClr val="bg1">
+                  <a:lumMod val="75000"/>
+                </a:schemeClr>
+              </a:solidFill>
+              <a:ln>
+                <a:noFill/>
+              </a:ln>
+            </p:spPr>
+            <p:style>
+              <a:lnRef idx="2">
+                <a:schemeClr val="accent1">
+                  <a:shade val="15000"/>
+                </a:schemeClr>
+              </a:lnRef>
+              <a:fillRef idx="1">
+                <a:schemeClr val="accent1"/>
+              </a:fillRef>
+              <a:effectRef idx="0">
+                <a:schemeClr val="accent1"/>
+              </a:effectRef>
+              <a:fontRef idx="minor">
+                <a:schemeClr val="lt1"/>
+              </a:fontRef>
+            </p:style>
+            <p:txBody>
+              <a:bodyPr rtlCol="0" anchor="ctr"/>
+              <a:lstStyle/>
+              <a:p>
+                <a:pPr algn="ctr"/>
+                <a:endParaRPr lang="en-GB">
+                  <a:solidFill>
+                    <a:schemeClr val="bg1">
+                      <a:lumMod val="95000"/>
+                    </a:schemeClr>
+                  </a:solidFill>
+                </a:endParaRPr>
+              </a:p>
+            </p:txBody>
+          </p:sp>
+          <p:sp>
+            <p:nvSpPr>
+              <p:cNvPr id="161" name="椭圆 160">
+                <a:extLst>
+                  <a:ext uri="{FF2B5EF4-FFF2-40B4-BE49-F238E27FC236}">
+                    <a16:creationId xmlns:a16="http://schemas.microsoft.com/office/drawing/2014/main" id="{6C70382D-B5C9-5060-413B-8326AB746557}"/>
+                  </a:ext>
+                </a:extLst>
+              </p:cNvPr>
+              <p:cNvSpPr/>
+              <p:nvPr/>
+            </p:nvSpPr>
+            <p:spPr>
+              <a:xfrm>
+                <a:off x="2449441" y="2979620"/>
+                <a:ext cx="205051" cy="205051"/>
+              </a:xfrm>
+              <a:prstGeom prst="ellipse">
+                <a:avLst/>
+              </a:prstGeom>
+              <a:solidFill>
+                <a:schemeClr val="bg1">
+                  <a:lumMod val="75000"/>
+                </a:schemeClr>
+              </a:solidFill>
+              <a:ln>
+                <a:noFill/>
+              </a:ln>
+            </p:spPr>
+            <p:style>
+              <a:lnRef idx="2">
+                <a:schemeClr val="accent1">
+                  <a:shade val="15000"/>
+                </a:schemeClr>
+              </a:lnRef>
+              <a:fillRef idx="1">
+                <a:schemeClr val="accent1"/>
+              </a:fillRef>
+              <a:effectRef idx="0">
+                <a:schemeClr val="accent1"/>
+              </a:effectRef>
+              <a:fontRef idx="minor">
+                <a:schemeClr val="lt1"/>
+              </a:fontRef>
+            </p:style>
+            <p:txBody>
+              <a:bodyPr rtlCol="0" anchor="ctr"/>
+              <a:lstStyle/>
+              <a:p>
+                <a:pPr algn="ctr"/>
+                <a:endParaRPr lang="en-GB">
+                  <a:solidFill>
+                    <a:schemeClr val="bg1">
+                      <a:lumMod val="95000"/>
+                    </a:schemeClr>
+                  </a:solidFill>
+                </a:endParaRPr>
+              </a:p>
+            </p:txBody>
+          </p:sp>
+          <p:sp>
+            <p:nvSpPr>
+              <p:cNvPr id="162" name="椭圆 161">
+                <a:extLst>
+                  <a:ext uri="{FF2B5EF4-FFF2-40B4-BE49-F238E27FC236}">
+                    <a16:creationId xmlns:a16="http://schemas.microsoft.com/office/drawing/2014/main" id="{5FB35C57-2DB3-CB15-2C45-81A2B780270F}"/>
+                  </a:ext>
+                </a:extLst>
+              </p:cNvPr>
+              <p:cNvSpPr/>
+              <p:nvPr/>
+            </p:nvSpPr>
+            <p:spPr>
+              <a:xfrm>
+                <a:off x="2885341" y="2353720"/>
+                <a:ext cx="205051" cy="205051"/>
+              </a:xfrm>
+              <a:prstGeom prst="ellipse">
+                <a:avLst/>
+              </a:prstGeom>
+              <a:solidFill>
+                <a:srgbClr val="C00000"/>
+              </a:solidFill>
+              <a:ln>
+                <a:noFill/>
+              </a:ln>
+            </p:spPr>
+            <p:style>
+              <a:lnRef idx="2">
+                <a:schemeClr val="accent1">
+                  <a:shade val="15000"/>
+                </a:schemeClr>
+              </a:lnRef>
+              <a:fillRef idx="1">
+                <a:schemeClr val="accent1"/>
+              </a:fillRef>
+              <a:effectRef idx="0">
+                <a:schemeClr val="accent1"/>
+              </a:effectRef>
+              <a:fontRef idx="minor">
+                <a:schemeClr val="lt1"/>
+              </a:fontRef>
+            </p:style>
+            <p:txBody>
+              <a:bodyPr rtlCol="0" anchor="ctr"/>
+              <a:lstStyle/>
+              <a:p>
+                <a:pPr algn="ctr"/>
+                <a:endParaRPr lang="en-GB"/>
+              </a:p>
+            </p:txBody>
+          </p:sp>
+          <p:sp>
+            <p:nvSpPr>
+              <p:cNvPr id="163" name="椭圆 162">
+                <a:extLst>
+                  <a:ext uri="{FF2B5EF4-FFF2-40B4-BE49-F238E27FC236}">
+                    <a16:creationId xmlns:a16="http://schemas.microsoft.com/office/drawing/2014/main" id="{AFE1E59D-296C-5D5C-6562-CAE0F6E847EB}"/>
+                  </a:ext>
+                </a:extLst>
+              </p:cNvPr>
+              <p:cNvSpPr/>
+              <p:nvPr/>
+            </p:nvSpPr>
+            <p:spPr>
+              <a:xfrm>
+                <a:off x="3243800" y="2184966"/>
+                <a:ext cx="205051" cy="205051"/>
+              </a:xfrm>
+              <a:prstGeom prst="ellipse">
+                <a:avLst/>
+              </a:prstGeom>
+              <a:solidFill>
+                <a:srgbClr val="C00000"/>
+              </a:solidFill>
+              <a:ln>
+                <a:noFill/>
+              </a:ln>
+            </p:spPr>
+            <p:style>
+              <a:lnRef idx="2">
+                <a:schemeClr val="accent1">
+                  <a:shade val="15000"/>
+                </a:schemeClr>
+              </a:lnRef>
+              <a:fillRef idx="1">
+                <a:schemeClr val="accent1"/>
+              </a:fillRef>
+              <a:effectRef idx="0">
+                <a:schemeClr val="accent1"/>
+              </a:effectRef>
+              <a:fontRef idx="minor">
+                <a:schemeClr val="lt1"/>
+              </a:fontRef>
+            </p:style>
+            <p:txBody>
+              <a:bodyPr rtlCol="0" anchor="ctr"/>
+              <a:lstStyle/>
+              <a:p>
+                <a:pPr algn="ctr"/>
+                <a:endParaRPr lang="en-GB"/>
+              </a:p>
+            </p:txBody>
+          </p:sp>
+          <p:sp>
+            <p:nvSpPr>
+              <p:cNvPr id="164" name="椭圆 163">
+                <a:extLst>
+                  <a:ext uri="{FF2B5EF4-FFF2-40B4-BE49-F238E27FC236}">
+                    <a16:creationId xmlns:a16="http://schemas.microsoft.com/office/drawing/2014/main" id="{A08AA395-24AB-52F6-E5C9-F68ABDAC7BDD}"/>
+                  </a:ext>
+                </a:extLst>
+              </p:cNvPr>
+              <p:cNvSpPr/>
+              <p:nvPr/>
+            </p:nvSpPr>
+            <p:spPr>
+              <a:xfrm>
+                <a:off x="3579718" y="2240247"/>
+                <a:ext cx="205051" cy="205051"/>
+              </a:xfrm>
+              <a:prstGeom prst="ellipse">
+                <a:avLst/>
+              </a:prstGeom>
+              <a:solidFill>
+                <a:srgbClr val="C00000"/>
+              </a:solidFill>
+              <a:ln>
+                <a:noFill/>
+              </a:ln>
+            </p:spPr>
+            <p:style>
+              <a:lnRef idx="2">
+                <a:schemeClr val="accent1">
+                  <a:shade val="15000"/>
+                </a:schemeClr>
+              </a:lnRef>
+              <a:fillRef idx="1">
+                <a:schemeClr val="accent1"/>
+              </a:fillRef>
+              <a:effectRef idx="0">
+                <a:schemeClr val="accent1"/>
+              </a:effectRef>
+              <a:fontRef idx="minor">
+                <a:schemeClr val="lt1"/>
+              </a:fontRef>
+            </p:style>
+            <p:txBody>
+              <a:bodyPr rtlCol="0" anchor="ctr"/>
+              <a:lstStyle/>
+              <a:p>
+                <a:pPr algn="ctr"/>
+                <a:endParaRPr lang="en-GB" dirty="0"/>
+              </a:p>
+            </p:txBody>
+          </p:sp>
+          <p:sp>
+            <p:nvSpPr>
+              <p:cNvPr id="165" name="椭圆 164">
+                <a:extLst>
+                  <a:ext uri="{FF2B5EF4-FFF2-40B4-BE49-F238E27FC236}">
+                    <a16:creationId xmlns:a16="http://schemas.microsoft.com/office/drawing/2014/main" id="{285DB5CB-3537-90B3-20A3-EB5E0141F5A9}"/>
+                  </a:ext>
+                </a:extLst>
+              </p:cNvPr>
+              <p:cNvSpPr/>
+              <p:nvPr/>
+            </p:nvSpPr>
+            <p:spPr>
+              <a:xfrm>
+                <a:off x="1123763" y="2581259"/>
+                <a:ext cx="205051" cy="205051"/>
+              </a:xfrm>
+              <a:prstGeom prst="ellipse">
+                <a:avLst/>
+              </a:prstGeom>
+              <a:solidFill>
+                <a:srgbClr val="28D25C"/>
+              </a:solidFill>
+              <a:ln>
+                <a:noFill/>
+              </a:ln>
+            </p:spPr>
+            <p:style>
+              <a:lnRef idx="2">
+                <a:schemeClr val="accent1">
+                  <a:shade val="15000"/>
+                </a:schemeClr>
+              </a:lnRef>
+              <a:fillRef idx="1">
+                <a:schemeClr val="accent1"/>
+              </a:fillRef>
+              <a:effectRef idx="0">
+                <a:schemeClr val="accent1"/>
+              </a:effectRef>
+              <a:fontRef idx="minor">
+                <a:schemeClr val="lt1"/>
+              </a:fontRef>
+            </p:style>
+            <p:txBody>
+              <a:bodyPr rtlCol="0" anchor="ctr"/>
+              <a:lstStyle/>
+              <a:p>
+                <a:pPr algn="ctr"/>
+                <a:endParaRPr lang="en-GB"/>
+              </a:p>
+            </p:txBody>
+          </p:sp>
+        </p:grpSp>
+        <p:sp>
+          <p:nvSpPr>
+            <p:cNvPr id="154" name="椭圆 153">
+              <a:extLst>
+                <a:ext uri="{FF2B5EF4-FFF2-40B4-BE49-F238E27FC236}">
+                  <a16:creationId xmlns:a16="http://schemas.microsoft.com/office/drawing/2014/main" id="{4D494EB2-AA59-5EA9-5F34-7986A8FA474C}"/>
+                </a:ext>
+              </a:extLst>
+            </p:cNvPr>
+            <p:cNvSpPr/>
+            <p:nvPr/>
+          </p:nvSpPr>
+          <p:spPr>
+            <a:xfrm>
+              <a:off x="148682" y="1998515"/>
+              <a:ext cx="205051" cy="205051"/>
+            </a:xfrm>
+            <a:prstGeom prst="ellipse">
+              <a:avLst/>
+            </a:prstGeom>
+            <a:solidFill>
+              <a:srgbClr val="C00000"/>
+            </a:solidFill>
+            <a:ln>
+              <a:noFill/>
+            </a:ln>
+          </p:spPr>
+          <p:style>
+            <a:lnRef idx="2">
+              <a:schemeClr val="accent1">
+                <a:shade val="15000"/>
+              </a:schemeClr>
+            </a:lnRef>
+            <a:fillRef idx="1">
+              <a:schemeClr val="accent1"/>
+            </a:fillRef>
+            <a:effectRef idx="0">
+              <a:schemeClr val="accent1"/>
+            </a:effectRef>
+            <a:fontRef idx="minor">
+              <a:schemeClr val="lt1"/>
+            </a:fontRef>
+          </p:style>
+          <p:txBody>
+            <a:bodyPr rtlCol="0" anchor="ctr"/>
+            <a:lstStyle/>
+            <a:p>
+              <a:pPr algn="ctr"/>
+              <a:endParaRPr lang="en-GB"/>
+            </a:p>
+          </p:txBody>
+        </p:sp>
+      </p:grpSp>
+      <p:cxnSp>
+        <p:nvCxnSpPr>
+          <p:cNvPr id="167" name="直接箭头连接符 166">
+            <a:extLst>
+              <a:ext uri="{FF2B5EF4-FFF2-40B4-BE49-F238E27FC236}">
+                <a16:creationId xmlns:a16="http://schemas.microsoft.com/office/drawing/2014/main" id="{683227B4-18DC-ECF5-7A91-24C0555AEA57}"/>
+              </a:ext>
+            </a:extLst>
+          </p:cNvPr>
+          <p:cNvCxnSpPr/>
+          <p:nvPr/>
+        </p:nvCxnSpPr>
+        <p:spPr>
+          <a:xfrm>
+            <a:off x="1520812" y="1730440"/>
+            <a:ext cx="0" cy="260332"/>
+          </a:xfrm>
+          <a:prstGeom prst="straightConnector1">
+            <a:avLst/>
+          </a:prstGeom>
+          <a:ln>
+            <a:solidFill>
+              <a:srgbClr val="28D25C"/>
+            </a:solidFill>
+            <a:tailEnd type="triangle"/>
+          </a:ln>
+        </p:spPr>
+        <p:style>
+          <a:lnRef idx="2">
+            <a:schemeClr val="accent1"/>
+          </a:lnRef>
+          <a:fillRef idx="0">
+            <a:schemeClr val="accent1"/>
+          </a:fillRef>
+          <a:effectRef idx="1">
+            <a:schemeClr val="accent1"/>
+          </a:effectRef>
+          <a:fontRef idx="minor">
+            <a:schemeClr val="tx1"/>
+          </a:fontRef>
+        </p:style>
+      </p:cxnSp>
+      <p:cxnSp>
+        <p:nvCxnSpPr>
+          <p:cNvPr id="168" name="直接箭头连接符 167">
+            <a:extLst>
+              <a:ext uri="{FF2B5EF4-FFF2-40B4-BE49-F238E27FC236}">
+                <a16:creationId xmlns:a16="http://schemas.microsoft.com/office/drawing/2014/main" id="{D14F7CFA-2682-FF2E-84BF-29E8B8128DC9}"/>
+              </a:ext>
+            </a:extLst>
+          </p:cNvPr>
+          <p:cNvCxnSpPr/>
+          <p:nvPr/>
+        </p:nvCxnSpPr>
+        <p:spPr>
+          <a:xfrm>
+            <a:off x="5975146" y="1748504"/>
+            <a:ext cx="0" cy="260332"/>
+          </a:xfrm>
+          <a:prstGeom prst="straightConnector1">
+            <a:avLst/>
+          </a:prstGeom>
+          <a:ln>
+            <a:solidFill>
+              <a:srgbClr val="28D25C"/>
+            </a:solidFill>
+            <a:tailEnd type="triangle"/>
+          </a:ln>
+        </p:spPr>
+        <p:style>
+          <a:lnRef idx="2">
+            <a:schemeClr val="accent1"/>
+          </a:lnRef>
+          <a:fillRef idx="0">
+            <a:schemeClr val="accent1"/>
+          </a:fillRef>
+          <a:effectRef idx="1">
+            <a:schemeClr val="accent1"/>
+          </a:effectRef>
+          <a:fontRef idx="minor">
+            <a:schemeClr val="tx1"/>
+          </a:fontRef>
+        </p:style>
+      </p:cxnSp>
+      <p:grpSp>
+        <p:nvGrpSpPr>
+          <p:cNvPr id="169" name="组合 168">
+            <a:extLst>
+              <a:ext uri="{FF2B5EF4-FFF2-40B4-BE49-F238E27FC236}">
+                <a16:creationId xmlns:a16="http://schemas.microsoft.com/office/drawing/2014/main" id="{74B51D93-FFC7-BAF3-A7A1-D46E9CEC4EE9}"/>
+              </a:ext>
+            </a:extLst>
+          </p:cNvPr>
+          <p:cNvGrpSpPr/>
+          <p:nvPr/>
+        </p:nvGrpSpPr>
+        <p:grpSpPr>
+          <a:xfrm>
+            <a:off x="8718055" y="1682370"/>
+            <a:ext cx="3155727" cy="956438"/>
+            <a:chOff x="124332" y="1449477"/>
+            <a:chExt cx="3990975" cy="1209586"/>
+          </a:xfrm>
+        </p:grpSpPr>
+        <p:grpSp>
+          <p:nvGrpSpPr>
+            <p:cNvPr id="170" name="组合 169">
+              <a:extLst>
+                <a:ext uri="{FF2B5EF4-FFF2-40B4-BE49-F238E27FC236}">
+                  <a16:creationId xmlns:a16="http://schemas.microsoft.com/office/drawing/2014/main" id="{DFD5E957-97A8-934C-69AD-6E2B7056DD66}"/>
+                </a:ext>
+              </a:extLst>
+            </p:cNvPr>
+            <p:cNvGrpSpPr/>
+            <p:nvPr/>
+          </p:nvGrpSpPr>
+          <p:grpSpPr>
+            <a:xfrm>
+              <a:off x="124332" y="1449477"/>
+              <a:ext cx="3990975" cy="1209586"/>
+              <a:chOff x="124332" y="2011452"/>
+              <a:chExt cx="3990975" cy="1209586"/>
+            </a:xfrm>
+          </p:grpSpPr>
+          <p:cxnSp>
+            <p:nvCxnSpPr>
+              <p:cNvPr id="172" name="直接连接符 171">
+                <a:extLst>
+                  <a:ext uri="{FF2B5EF4-FFF2-40B4-BE49-F238E27FC236}">
+                    <a16:creationId xmlns:a16="http://schemas.microsoft.com/office/drawing/2014/main" id="{C33C2455-943C-6A10-A84E-DBD61B67F4D9}"/>
+                  </a:ext>
+                </a:extLst>
+              </p:cNvPr>
+              <p:cNvCxnSpPr>
+                <a:cxnSpLocks/>
+              </p:cNvCxnSpPr>
+              <p:nvPr/>
+            </p:nvCxnSpPr>
+            <p:spPr>
+              <a:xfrm>
+                <a:off x="124332" y="2884957"/>
+                <a:ext cx="3990975" cy="0"/>
+              </a:xfrm>
+              <a:prstGeom prst="line">
+                <a:avLst/>
+              </a:prstGeom>
+              <a:noFill/>
+              <a:ln w="38100"/>
+            </p:spPr>
+            <p:style>
+              <a:lnRef idx="2">
+                <a:schemeClr val="accent1">
+                  <a:shade val="15000"/>
+                </a:schemeClr>
+              </a:lnRef>
+              <a:fillRef idx="1">
+                <a:schemeClr val="accent1"/>
+              </a:fillRef>
+              <a:effectRef idx="0">
+                <a:schemeClr val="accent1"/>
+              </a:effectRef>
+              <a:fontRef idx="minor">
+                <a:schemeClr val="lt1"/>
+              </a:fontRef>
+            </p:style>
+          </p:cxnSp>
+          <p:sp>
+            <p:nvSpPr>
+              <p:cNvPr id="173" name="椭圆 172">
+                <a:extLst>
+                  <a:ext uri="{FF2B5EF4-FFF2-40B4-BE49-F238E27FC236}">
+                    <a16:creationId xmlns:a16="http://schemas.microsoft.com/office/drawing/2014/main" id="{F4F770C4-95A2-2EF6-98AC-A349653B3176}"/>
+                  </a:ext>
+                </a:extLst>
+              </p:cNvPr>
+              <p:cNvSpPr/>
+              <p:nvPr/>
+            </p:nvSpPr>
+            <p:spPr>
+              <a:xfrm>
+                <a:off x="495096" y="2585244"/>
+                <a:ext cx="205051" cy="205051"/>
+              </a:xfrm>
+              <a:prstGeom prst="ellipse">
+                <a:avLst/>
+              </a:prstGeom>
+              <a:solidFill>
+                <a:srgbClr val="C00000"/>
+              </a:solidFill>
+              <a:ln>
+                <a:noFill/>
+              </a:ln>
+            </p:spPr>
+            <p:style>
+              <a:lnRef idx="2">
+                <a:schemeClr val="accent1">
+                  <a:shade val="15000"/>
+                </a:schemeClr>
+              </a:lnRef>
+              <a:fillRef idx="1">
+                <a:schemeClr val="accent1"/>
+              </a:fillRef>
+              <a:effectRef idx="0">
+                <a:schemeClr val="accent1"/>
+              </a:effectRef>
+              <a:fontRef idx="minor">
+                <a:schemeClr val="lt1"/>
+              </a:fontRef>
+            </p:style>
+            <p:txBody>
+              <a:bodyPr rtlCol="0" anchor="ctr"/>
+              <a:lstStyle/>
+              <a:p>
+                <a:pPr algn="ctr"/>
+                <a:endParaRPr lang="en-GB"/>
+              </a:p>
+            </p:txBody>
+          </p:sp>
+          <p:sp>
+            <p:nvSpPr>
+              <p:cNvPr id="174" name="椭圆 173">
+                <a:extLst>
+                  <a:ext uri="{FF2B5EF4-FFF2-40B4-BE49-F238E27FC236}">
+                    <a16:creationId xmlns:a16="http://schemas.microsoft.com/office/drawing/2014/main" id="{6F9D84DD-C5E8-F9C0-78CD-A8EDD470D2F0}"/>
+                  </a:ext>
+                </a:extLst>
+              </p:cNvPr>
+              <p:cNvSpPr/>
+              <p:nvPr/>
+            </p:nvSpPr>
+            <p:spPr>
+              <a:xfrm>
+                <a:off x="884177" y="3015987"/>
+                <a:ext cx="205051" cy="205051"/>
+              </a:xfrm>
+              <a:prstGeom prst="ellipse">
+                <a:avLst/>
+              </a:prstGeom>
+              <a:solidFill>
+                <a:schemeClr val="bg1">
+                  <a:lumMod val="75000"/>
+                </a:schemeClr>
+              </a:solidFill>
+              <a:ln>
+                <a:noFill/>
+              </a:ln>
+            </p:spPr>
+            <p:style>
+              <a:lnRef idx="2">
+                <a:schemeClr val="accent1">
+                  <a:shade val="15000"/>
+                </a:schemeClr>
+              </a:lnRef>
+              <a:fillRef idx="1">
+                <a:schemeClr val="accent1"/>
+              </a:fillRef>
+              <a:effectRef idx="0">
+                <a:schemeClr val="accent1"/>
+              </a:effectRef>
+              <a:fontRef idx="minor">
+                <a:schemeClr val="lt1"/>
+              </a:fontRef>
+            </p:style>
+            <p:txBody>
+              <a:bodyPr rtlCol="0" anchor="ctr"/>
+              <a:lstStyle/>
+              <a:p>
+                <a:pPr algn="ctr"/>
+                <a:endParaRPr lang="en-GB" dirty="0">
+                  <a:solidFill>
+                    <a:schemeClr val="bg1">
+                      <a:lumMod val="95000"/>
+                    </a:schemeClr>
+                  </a:solidFill>
+                </a:endParaRPr>
+              </a:p>
+            </p:txBody>
+          </p:sp>
+          <p:sp>
+            <p:nvSpPr>
+              <p:cNvPr id="175" name="椭圆 174">
+                <a:extLst>
+                  <a:ext uri="{FF2B5EF4-FFF2-40B4-BE49-F238E27FC236}">
+                    <a16:creationId xmlns:a16="http://schemas.microsoft.com/office/drawing/2014/main" id="{7DF9BE09-C1B9-2EBB-717E-6BE449AC1A0D}"/>
+                  </a:ext>
+                </a:extLst>
+              </p:cNvPr>
+              <p:cNvSpPr/>
+              <p:nvPr/>
+            </p:nvSpPr>
+            <p:spPr>
+              <a:xfrm>
+                <a:off x="1450581" y="2560490"/>
+                <a:ext cx="205051" cy="205051"/>
+              </a:xfrm>
+              <a:prstGeom prst="ellipse">
+                <a:avLst/>
+              </a:prstGeom>
+              <a:solidFill>
+                <a:srgbClr val="C00000"/>
+              </a:solidFill>
+              <a:ln>
+                <a:noFill/>
+              </a:ln>
+            </p:spPr>
+            <p:style>
+              <a:lnRef idx="2">
+                <a:schemeClr val="accent1">
+                  <a:shade val="15000"/>
+                </a:schemeClr>
+              </a:lnRef>
+              <a:fillRef idx="1">
+                <a:schemeClr val="accent1"/>
+              </a:fillRef>
+              <a:effectRef idx="0">
+                <a:schemeClr val="accent1"/>
+              </a:effectRef>
+              <a:fontRef idx="minor">
+                <a:schemeClr val="lt1"/>
+              </a:fontRef>
+            </p:style>
+            <p:txBody>
+              <a:bodyPr rtlCol="0" anchor="ctr"/>
+              <a:lstStyle/>
+              <a:p>
+                <a:pPr algn="ctr"/>
+                <a:endParaRPr lang="en-GB" dirty="0"/>
+              </a:p>
+            </p:txBody>
+          </p:sp>
+          <p:sp>
+            <p:nvSpPr>
+              <p:cNvPr id="176" name="椭圆 175">
+                <a:extLst>
+                  <a:ext uri="{FF2B5EF4-FFF2-40B4-BE49-F238E27FC236}">
+                    <a16:creationId xmlns:a16="http://schemas.microsoft.com/office/drawing/2014/main" id="{13CD0822-E532-7CFA-BA43-26379B0F225B}"/>
+                  </a:ext>
+                </a:extLst>
+              </p:cNvPr>
+              <p:cNvSpPr/>
+              <p:nvPr/>
+            </p:nvSpPr>
+            <p:spPr>
+              <a:xfrm>
+                <a:off x="1821602" y="2548877"/>
+                <a:ext cx="205051" cy="205051"/>
+              </a:xfrm>
+              <a:prstGeom prst="ellipse">
+                <a:avLst/>
+              </a:prstGeom>
+              <a:solidFill>
+                <a:srgbClr val="C00000"/>
+              </a:solidFill>
+              <a:ln>
+                <a:noFill/>
+              </a:ln>
+            </p:spPr>
+            <p:style>
+              <a:lnRef idx="2">
+                <a:schemeClr val="accent1">
+                  <a:shade val="15000"/>
+                </a:schemeClr>
+              </a:lnRef>
+              <a:fillRef idx="1">
+                <a:schemeClr val="accent1"/>
+              </a:fillRef>
+              <a:effectRef idx="0">
+                <a:schemeClr val="accent1"/>
+              </a:effectRef>
+              <a:fontRef idx="minor">
+                <a:schemeClr val="lt1"/>
+              </a:fontRef>
+            </p:style>
+            <p:txBody>
+              <a:bodyPr rtlCol="0" anchor="ctr"/>
+              <a:lstStyle/>
+              <a:p>
+                <a:pPr algn="ctr"/>
+                <a:endParaRPr lang="en-GB"/>
+              </a:p>
+            </p:txBody>
+          </p:sp>
+          <p:sp>
+            <p:nvSpPr>
+              <p:cNvPr id="177" name="椭圆 176">
+                <a:extLst>
+                  <a:ext uri="{FF2B5EF4-FFF2-40B4-BE49-F238E27FC236}">
+                    <a16:creationId xmlns:a16="http://schemas.microsoft.com/office/drawing/2014/main" id="{33AD4DA4-046B-7048-F1FB-12344CBDD04D}"/>
+                  </a:ext>
+                </a:extLst>
+              </p:cNvPr>
+              <p:cNvSpPr/>
+              <p:nvPr/>
+            </p:nvSpPr>
+            <p:spPr>
+              <a:xfrm>
+                <a:off x="2119819" y="3000774"/>
+                <a:ext cx="205051" cy="205051"/>
+              </a:xfrm>
+              <a:prstGeom prst="ellipse">
+                <a:avLst/>
+              </a:prstGeom>
+              <a:solidFill>
+                <a:schemeClr val="bg1">
+                  <a:lumMod val="75000"/>
+                </a:schemeClr>
+              </a:solidFill>
+              <a:ln>
+                <a:noFill/>
+              </a:ln>
+            </p:spPr>
+            <p:style>
+              <a:lnRef idx="2">
+                <a:schemeClr val="accent1">
+                  <a:shade val="15000"/>
+                </a:schemeClr>
+              </a:lnRef>
+              <a:fillRef idx="1">
+                <a:schemeClr val="accent1"/>
+              </a:fillRef>
+              <a:effectRef idx="0">
+                <a:schemeClr val="accent1"/>
+              </a:effectRef>
+              <a:fontRef idx="minor">
+                <a:schemeClr val="lt1"/>
+              </a:fontRef>
+            </p:style>
+            <p:txBody>
+              <a:bodyPr rtlCol="0" anchor="ctr"/>
+              <a:lstStyle/>
+              <a:p>
+                <a:pPr algn="ctr"/>
+                <a:endParaRPr lang="en-GB">
+                  <a:solidFill>
+                    <a:schemeClr val="bg1">
+                      <a:lumMod val="95000"/>
+                    </a:schemeClr>
+                  </a:solidFill>
+                </a:endParaRPr>
+              </a:p>
+            </p:txBody>
+          </p:sp>
+          <p:sp>
+            <p:nvSpPr>
+              <p:cNvPr id="178" name="椭圆 177">
+                <a:extLst>
+                  <a:ext uri="{FF2B5EF4-FFF2-40B4-BE49-F238E27FC236}">
+                    <a16:creationId xmlns:a16="http://schemas.microsoft.com/office/drawing/2014/main" id="{CC16D026-9B7A-0AB3-CAD7-999C350FC201}"/>
+                  </a:ext>
+                </a:extLst>
+              </p:cNvPr>
+              <p:cNvSpPr/>
+              <p:nvPr/>
+            </p:nvSpPr>
+            <p:spPr>
+              <a:xfrm>
+                <a:off x="2449441" y="2979620"/>
+                <a:ext cx="205051" cy="205051"/>
+              </a:xfrm>
+              <a:prstGeom prst="ellipse">
+                <a:avLst/>
+              </a:prstGeom>
+              <a:solidFill>
+                <a:schemeClr val="bg1">
+                  <a:lumMod val="75000"/>
+                </a:schemeClr>
+              </a:solidFill>
+              <a:ln>
+                <a:noFill/>
+              </a:ln>
+            </p:spPr>
+            <p:style>
+              <a:lnRef idx="2">
+                <a:schemeClr val="accent1">
+                  <a:shade val="15000"/>
+                </a:schemeClr>
+              </a:lnRef>
+              <a:fillRef idx="1">
+                <a:schemeClr val="accent1"/>
+              </a:fillRef>
+              <a:effectRef idx="0">
+                <a:schemeClr val="accent1"/>
+              </a:effectRef>
+              <a:fontRef idx="minor">
+                <a:schemeClr val="lt1"/>
+              </a:fontRef>
+            </p:style>
+            <p:txBody>
+              <a:bodyPr rtlCol="0" anchor="ctr"/>
+              <a:lstStyle/>
+              <a:p>
+                <a:pPr algn="ctr"/>
+                <a:endParaRPr lang="en-GB">
+                  <a:solidFill>
+                    <a:schemeClr val="bg1">
+                      <a:lumMod val="95000"/>
+                    </a:schemeClr>
+                  </a:solidFill>
+                </a:endParaRPr>
+              </a:p>
+            </p:txBody>
+          </p:sp>
+          <p:sp>
+            <p:nvSpPr>
+              <p:cNvPr id="179" name="椭圆 178">
+                <a:extLst>
+                  <a:ext uri="{FF2B5EF4-FFF2-40B4-BE49-F238E27FC236}">
+                    <a16:creationId xmlns:a16="http://schemas.microsoft.com/office/drawing/2014/main" id="{4F1F5CBE-B56A-8520-7BE9-D7619BACAAE9}"/>
+                  </a:ext>
+                </a:extLst>
+              </p:cNvPr>
+              <p:cNvSpPr/>
+              <p:nvPr/>
+            </p:nvSpPr>
+            <p:spPr>
+              <a:xfrm>
+                <a:off x="2665311" y="2526852"/>
+                <a:ext cx="205051" cy="205051"/>
+              </a:xfrm>
+              <a:prstGeom prst="ellipse">
+                <a:avLst/>
+              </a:prstGeom>
+              <a:solidFill>
+                <a:srgbClr val="28D25C"/>
+              </a:solidFill>
+              <a:ln>
+                <a:noFill/>
+              </a:ln>
+            </p:spPr>
+            <p:style>
+              <a:lnRef idx="2">
+                <a:schemeClr val="accent1">
+                  <a:shade val="15000"/>
+                </a:schemeClr>
+              </a:lnRef>
+              <a:fillRef idx="1">
+                <a:schemeClr val="accent1"/>
+              </a:fillRef>
+              <a:effectRef idx="0">
+                <a:schemeClr val="accent1"/>
+              </a:effectRef>
+              <a:fontRef idx="minor">
+                <a:schemeClr val="lt1"/>
+              </a:fontRef>
+            </p:style>
+            <p:txBody>
+              <a:bodyPr rtlCol="0" anchor="ctr"/>
+              <a:lstStyle/>
+              <a:p>
+                <a:pPr algn="ctr"/>
+                <a:endParaRPr lang="en-GB"/>
+              </a:p>
+            </p:txBody>
+          </p:sp>
+          <p:sp>
+            <p:nvSpPr>
+              <p:cNvPr id="180" name="椭圆 179">
+                <a:extLst>
+                  <a:ext uri="{FF2B5EF4-FFF2-40B4-BE49-F238E27FC236}">
+                    <a16:creationId xmlns:a16="http://schemas.microsoft.com/office/drawing/2014/main" id="{DDBDE553-1B47-D998-124C-94BC0B9AD14C}"/>
+                  </a:ext>
+                </a:extLst>
+              </p:cNvPr>
+              <p:cNvSpPr/>
+              <p:nvPr/>
+            </p:nvSpPr>
+            <p:spPr>
+              <a:xfrm>
+                <a:off x="3027026" y="2011452"/>
+                <a:ext cx="205051" cy="205051"/>
+              </a:xfrm>
+              <a:prstGeom prst="ellipse">
+                <a:avLst/>
+              </a:prstGeom>
+              <a:solidFill>
+                <a:srgbClr val="C00000"/>
+              </a:solidFill>
+              <a:ln>
+                <a:noFill/>
+              </a:ln>
+            </p:spPr>
+            <p:style>
+              <a:lnRef idx="2">
+                <a:schemeClr val="accent1">
+                  <a:shade val="15000"/>
+                </a:schemeClr>
+              </a:lnRef>
+              <a:fillRef idx="1">
+                <a:schemeClr val="accent1"/>
+              </a:fillRef>
+              <a:effectRef idx="0">
+                <a:schemeClr val="accent1"/>
+              </a:effectRef>
+              <a:fontRef idx="minor">
+                <a:schemeClr val="lt1"/>
+              </a:fontRef>
+            </p:style>
+            <p:txBody>
+              <a:bodyPr rtlCol="0" anchor="ctr"/>
+              <a:lstStyle/>
+              <a:p>
+                <a:pPr algn="ctr"/>
+                <a:endParaRPr lang="en-GB" dirty="0"/>
+              </a:p>
+            </p:txBody>
+          </p:sp>
+          <p:sp>
+            <p:nvSpPr>
+              <p:cNvPr id="181" name="椭圆 180">
+                <a:extLst>
+                  <a:ext uri="{FF2B5EF4-FFF2-40B4-BE49-F238E27FC236}">
+                    <a16:creationId xmlns:a16="http://schemas.microsoft.com/office/drawing/2014/main" id="{43DBAF4E-F87B-C22C-EB3C-CC5E77E0F0D2}"/>
+                  </a:ext>
+                </a:extLst>
+              </p:cNvPr>
+              <p:cNvSpPr/>
+              <p:nvPr/>
+            </p:nvSpPr>
+            <p:spPr>
+              <a:xfrm>
+                <a:off x="3204309" y="2399910"/>
+                <a:ext cx="205051" cy="205051"/>
+              </a:xfrm>
+              <a:prstGeom prst="ellipse">
+                <a:avLst/>
+              </a:prstGeom>
+              <a:solidFill>
+                <a:srgbClr val="C00000"/>
+              </a:solidFill>
+              <a:ln>
+                <a:noFill/>
+              </a:ln>
+            </p:spPr>
+            <p:style>
+              <a:lnRef idx="2">
+                <a:schemeClr val="accent1">
+                  <a:shade val="15000"/>
+                </a:schemeClr>
+              </a:lnRef>
+              <a:fillRef idx="1">
+                <a:schemeClr val="accent1"/>
+              </a:fillRef>
+              <a:effectRef idx="0">
+                <a:schemeClr val="accent1"/>
+              </a:effectRef>
+              <a:fontRef idx="minor">
+                <a:schemeClr val="lt1"/>
+              </a:fontRef>
+            </p:style>
+            <p:txBody>
+              <a:bodyPr rtlCol="0" anchor="ctr"/>
+              <a:lstStyle/>
+              <a:p>
+                <a:pPr algn="ctr"/>
+                <a:endParaRPr lang="en-GB" dirty="0"/>
+              </a:p>
+            </p:txBody>
+          </p:sp>
+          <p:sp>
+            <p:nvSpPr>
+              <p:cNvPr id="182" name="椭圆 181">
+                <a:extLst>
+                  <a:ext uri="{FF2B5EF4-FFF2-40B4-BE49-F238E27FC236}">
+                    <a16:creationId xmlns:a16="http://schemas.microsoft.com/office/drawing/2014/main" id="{EDF08BC9-C3A1-67C4-1B29-B297FFFF3B9A}"/>
+                  </a:ext>
+                </a:extLst>
+              </p:cNvPr>
+              <p:cNvSpPr/>
+              <p:nvPr/>
+            </p:nvSpPr>
+            <p:spPr>
+              <a:xfrm>
+                <a:off x="1123763" y="2581259"/>
+                <a:ext cx="205051" cy="205051"/>
+              </a:xfrm>
+              <a:prstGeom prst="ellipse">
+                <a:avLst/>
+              </a:prstGeom>
+              <a:solidFill>
+                <a:srgbClr val="C00000"/>
+              </a:solidFill>
+              <a:ln>
+                <a:noFill/>
+              </a:ln>
+            </p:spPr>
+            <p:style>
+              <a:lnRef idx="2">
+                <a:schemeClr val="accent1">
+                  <a:shade val="15000"/>
+                </a:schemeClr>
+              </a:lnRef>
+              <a:fillRef idx="1">
+                <a:schemeClr val="accent1"/>
+              </a:fillRef>
+              <a:effectRef idx="0">
+                <a:schemeClr val="accent1"/>
+              </a:effectRef>
+              <a:fontRef idx="minor">
+                <a:schemeClr val="lt1"/>
+              </a:fontRef>
+            </p:style>
+            <p:txBody>
+              <a:bodyPr rtlCol="0" anchor="ctr"/>
+              <a:lstStyle/>
+              <a:p>
+                <a:pPr algn="ctr"/>
+                <a:endParaRPr lang="en-GB"/>
+              </a:p>
+            </p:txBody>
+          </p:sp>
+          <p:sp>
+            <p:nvSpPr>
+              <p:cNvPr id="183" name="椭圆 182">
+                <a:extLst>
+                  <a:ext uri="{FF2B5EF4-FFF2-40B4-BE49-F238E27FC236}">
+                    <a16:creationId xmlns:a16="http://schemas.microsoft.com/office/drawing/2014/main" id="{34D22D15-1803-CED5-B6AA-ACC1DDDC9D48}"/>
+                  </a:ext>
+                </a:extLst>
+              </p:cNvPr>
+              <p:cNvSpPr/>
+              <p:nvPr/>
+            </p:nvSpPr>
+            <p:spPr>
+              <a:xfrm>
+                <a:off x="3383938" y="2173118"/>
+                <a:ext cx="205051" cy="205051"/>
+              </a:xfrm>
+              <a:prstGeom prst="ellipse">
+                <a:avLst/>
+              </a:prstGeom>
+              <a:solidFill>
+                <a:srgbClr val="C00000"/>
+              </a:solidFill>
+              <a:ln>
+                <a:noFill/>
+              </a:ln>
+            </p:spPr>
+            <p:style>
+              <a:lnRef idx="2">
+                <a:schemeClr val="accent1">
+                  <a:shade val="15000"/>
+                </a:schemeClr>
+              </a:lnRef>
+              <a:fillRef idx="1">
+                <a:schemeClr val="accent1"/>
+              </a:fillRef>
+              <a:effectRef idx="0">
+                <a:schemeClr val="accent1"/>
+              </a:effectRef>
+              <a:fontRef idx="minor">
+                <a:schemeClr val="lt1"/>
+              </a:fontRef>
+            </p:style>
+            <p:txBody>
+              <a:bodyPr rtlCol="0" anchor="ctr"/>
+              <a:lstStyle/>
+              <a:p>
+                <a:pPr algn="ctr"/>
+                <a:endParaRPr lang="en-GB" dirty="0"/>
+              </a:p>
+            </p:txBody>
+          </p:sp>
+          <p:sp>
+            <p:nvSpPr>
+              <p:cNvPr id="184" name="椭圆 183">
+                <a:extLst>
+                  <a:ext uri="{FF2B5EF4-FFF2-40B4-BE49-F238E27FC236}">
+                    <a16:creationId xmlns:a16="http://schemas.microsoft.com/office/drawing/2014/main" id="{02E30526-5969-4905-FE8C-24C42996BF55}"/>
+                  </a:ext>
+                </a:extLst>
+              </p:cNvPr>
+              <p:cNvSpPr/>
+              <p:nvPr/>
+            </p:nvSpPr>
+            <p:spPr>
+              <a:xfrm>
+                <a:off x="3568502" y="2424326"/>
+                <a:ext cx="205051" cy="205051"/>
+              </a:xfrm>
+              <a:prstGeom prst="ellipse">
+                <a:avLst/>
+              </a:prstGeom>
+              <a:solidFill>
+                <a:srgbClr val="C00000"/>
+              </a:solidFill>
+              <a:ln>
+                <a:noFill/>
+              </a:ln>
+            </p:spPr>
+            <p:style>
+              <a:lnRef idx="2">
+                <a:schemeClr val="accent1">
+                  <a:shade val="15000"/>
+                </a:schemeClr>
+              </a:lnRef>
+              <a:fillRef idx="1">
+                <a:schemeClr val="accent1"/>
+              </a:fillRef>
+              <a:effectRef idx="0">
+                <a:schemeClr val="accent1"/>
+              </a:effectRef>
+              <a:fontRef idx="minor">
+                <a:schemeClr val="lt1"/>
+              </a:fontRef>
+            </p:style>
+            <p:txBody>
+              <a:bodyPr rtlCol="0" anchor="ctr"/>
+              <a:lstStyle/>
+              <a:p>
+                <a:pPr algn="ctr"/>
+                <a:endParaRPr lang="en-GB" dirty="0"/>
+              </a:p>
+            </p:txBody>
+          </p:sp>
+          <p:sp>
+            <p:nvSpPr>
+              <p:cNvPr id="185" name="椭圆 184">
+                <a:extLst>
+                  <a:ext uri="{FF2B5EF4-FFF2-40B4-BE49-F238E27FC236}">
+                    <a16:creationId xmlns:a16="http://schemas.microsoft.com/office/drawing/2014/main" id="{9E617ADB-EC03-E5C0-9748-153460F8C00F}"/>
+                  </a:ext>
+                </a:extLst>
+              </p:cNvPr>
+              <p:cNvSpPr/>
+              <p:nvPr/>
+            </p:nvSpPr>
+            <p:spPr>
+              <a:xfrm>
+                <a:off x="3803234" y="2066221"/>
+                <a:ext cx="205051" cy="205051"/>
+              </a:xfrm>
+              <a:prstGeom prst="ellipse">
+                <a:avLst/>
+              </a:prstGeom>
+              <a:solidFill>
+                <a:srgbClr val="C00000"/>
+              </a:solidFill>
+              <a:ln>
+                <a:noFill/>
+              </a:ln>
+            </p:spPr>
+            <p:style>
+              <a:lnRef idx="2">
+                <a:schemeClr val="accent1">
+                  <a:shade val="15000"/>
+                </a:schemeClr>
+              </a:lnRef>
+              <a:fillRef idx="1">
+                <a:schemeClr val="accent1"/>
+              </a:fillRef>
+              <a:effectRef idx="0">
+                <a:schemeClr val="accent1"/>
+              </a:effectRef>
+              <a:fontRef idx="minor">
+                <a:schemeClr val="lt1"/>
+              </a:fontRef>
+            </p:style>
+            <p:txBody>
+              <a:bodyPr rtlCol="0" anchor="ctr"/>
+              <a:lstStyle/>
+              <a:p>
+                <a:pPr algn="ctr"/>
+                <a:endParaRPr lang="en-GB" dirty="0"/>
+              </a:p>
+            </p:txBody>
+          </p:sp>
+          <p:sp>
+            <p:nvSpPr>
+              <p:cNvPr id="186" name="椭圆 185">
+                <a:extLst>
+                  <a:ext uri="{FF2B5EF4-FFF2-40B4-BE49-F238E27FC236}">
+                    <a16:creationId xmlns:a16="http://schemas.microsoft.com/office/drawing/2014/main" id="{D6F3092C-9488-5C03-EDF7-EAD899780834}"/>
+                  </a:ext>
+                </a:extLst>
+              </p:cNvPr>
+              <p:cNvSpPr/>
+              <p:nvPr/>
+            </p:nvSpPr>
+            <p:spPr>
+              <a:xfrm>
+                <a:off x="2862116" y="2271272"/>
+                <a:ext cx="205051" cy="205051"/>
+              </a:xfrm>
+              <a:prstGeom prst="ellipse">
+                <a:avLst/>
+              </a:prstGeom>
+              <a:solidFill>
+                <a:srgbClr val="C00000"/>
+              </a:solidFill>
+              <a:ln>
+                <a:noFill/>
+              </a:ln>
+            </p:spPr>
+            <p:style>
+              <a:lnRef idx="2">
+                <a:schemeClr val="accent1">
+                  <a:shade val="15000"/>
+                </a:schemeClr>
+              </a:lnRef>
+              <a:fillRef idx="1">
+                <a:schemeClr val="accent1"/>
+              </a:fillRef>
+              <a:effectRef idx="0">
+                <a:schemeClr val="accent1"/>
+              </a:effectRef>
+              <a:fontRef idx="minor">
+                <a:schemeClr val="lt1"/>
+              </a:fontRef>
+            </p:style>
+            <p:txBody>
+              <a:bodyPr rtlCol="0" anchor="ctr"/>
+              <a:lstStyle/>
+              <a:p>
+                <a:pPr algn="ctr"/>
+                <a:endParaRPr lang="en-GB" dirty="0"/>
+              </a:p>
+            </p:txBody>
+          </p:sp>
+        </p:grpSp>
+        <p:sp>
+          <p:nvSpPr>
+            <p:cNvPr id="171" name="椭圆 170">
+              <a:extLst>
+                <a:ext uri="{FF2B5EF4-FFF2-40B4-BE49-F238E27FC236}">
+                  <a16:creationId xmlns:a16="http://schemas.microsoft.com/office/drawing/2014/main" id="{FFD1252C-4E62-023C-355F-C3192A36EE86}"/>
+                </a:ext>
+              </a:extLst>
+            </p:cNvPr>
+            <p:cNvSpPr/>
+            <p:nvPr/>
+          </p:nvSpPr>
+          <p:spPr>
+            <a:xfrm>
+              <a:off x="148682" y="1998515"/>
+              <a:ext cx="205051" cy="205051"/>
+            </a:xfrm>
+            <a:prstGeom prst="ellipse">
+              <a:avLst/>
+            </a:prstGeom>
+            <a:solidFill>
+              <a:srgbClr val="C00000"/>
+            </a:solidFill>
+            <a:ln>
+              <a:noFill/>
+            </a:ln>
+          </p:spPr>
+          <p:style>
+            <a:lnRef idx="2">
+              <a:schemeClr val="accent1">
+                <a:shade val="15000"/>
+              </a:schemeClr>
+            </a:lnRef>
+            <a:fillRef idx="1">
+              <a:schemeClr val="accent1"/>
+            </a:fillRef>
+            <a:effectRef idx="0">
+              <a:schemeClr val="accent1"/>
+            </a:effectRef>
+            <a:fontRef idx="minor">
+              <a:schemeClr val="lt1"/>
+            </a:fontRef>
+          </p:style>
+          <p:txBody>
+            <a:bodyPr rtlCol="0" anchor="ctr"/>
+            <a:lstStyle/>
+            <a:p>
+              <a:pPr algn="ctr"/>
+              <a:endParaRPr lang="en-GB"/>
+            </a:p>
+          </p:txBody>
+        </p:sp>
+      </p:grpSp>
+      <p:cxnSp>
+        <p:nvCxnSpPr>
+          <p:cNvPr id="187" name="直接箭头连接符 186">
+            <a:extLst>
+              <a:ext uri="{FF2B5EF4-FFF2-40B4-BE49-F238E27FC236}">
+                <a16:creationId xmlns:a16="http://schemas.microsoft.com/office/drawing/2014/main" id="{249B40F0-023A-F322-28C2-D1FDB5EB7898}"/>
+              </a:ext>
+            </a:extLst>
+          </p:cNvPr>
+          <p:cNvCxnSpPr/>
+          <p:nvPr/>
+        </p:nvCxnSpPr>
+        <p:spPr>
+          <a:xfrm>
+            <a:off x="11714627" y="1348257"/>
+            <a:ext cx="0" cy="260332"/>
+          </a:xfrm>
+          <a:prstGeom prst="straightConnector1">
+            <a:avLst/>
+          </a:prstGeom>
+          <a:ln>
+            <a:solidFill>
+              <a:srgbClr val="28D25C"/>
+            </a:solidFill>
+            <a:tailEnd type="triangle"/>
+          </a:ln>
+        </p:spPr>
+        <p:style>
+          <a:lnRef idx="2">
+            <a:schemeClr val="accent1"/>
+          </a:lnRef>
+          <a:fillRef idx="0">
+            <a:schemeClr val="accent1"/>
+          </a:fillRef>
+          <a:effectRef idx="1">
+            <a:schemeClr val="accent1"/>
+          </a:effectRef>
+          <a:fontRef idx="minor">
+            <a:schemeClr val="tx1"/>
+          </a:fontRef>
+        </p:style>
+      </p:cxnSp>
+    </p:spTree>
+    <p:extLst>
+      <p:ext uri="{BB962C8B-B14F-4D97-AF65-F5344CB8AC3E}">
+        <p14:creationId xmlns:p14="http://schemas.microsoft.com/office/powerpoint/2010/main" val="2601213738"/>
       </p:ext>
     </p:extLst>
   </p:cSld>

</xml_diff>